<commit_message>
Modified abstract for Review-3
</commit_message>
<xml_diff>
--- a/project_abstract (3).pptx
+++ b/project_abstract (3).pptx
@@ -272,7 +272,7 @@
   </p:defaultTextStyle>
   <p:extLst>
     <p:ext uri="{EFAFB233-063F-42B5-8137-9DF3F51BA10A}">
-      <p15:sldGuideLst xmlns="" xmlns:mc="http://schemas.openxmlformats.org/markup-compatibility/2006" xmlns:mv="urn:schemas-microsoft-com:mac:vml" xmlns:c="http://schemas.openxmlformats.org/drawingml/2006/chart" xmlns:dgm="http://schemas.openxmlformats.org/drawingml/2006/diagram" xmlns:o="urn:schemas-microsoft-com:office:office" xmlns:v="urn:schemas-microsoft-com:vml" xmlns:pvml="urn:schemas-microsoft-com:office:powerpoint" xmlns:com="http://schemas.openxmlformats.org/drawingml/2006/compatibility" xmlns:p14="http://schemas.microsoft.com/office/powerpoint/2010/main" xmlns:p15="http://schemas.microsoft.com/office/powerpoint/2012/main">
+      <p15:sldGuideLst xmlns:p15="http://schemas.microsoft.com/office/powerpoint/2012/main" xmlns:p14="http://schemas.microsoft.com/office/powerpoint/2010/main" xmlns:com="http://schemas.openxmlformats.org/drawingml/2006/compatibility" xmlns:pvml="urn:schemas-microsoft-com:office:powerpoint" xmlns:v="urn:schemas-microsoft-com:vml" xmlns:o="urn:schemas-microsoft-com:office:office" xmlns:dgm="http://schemas.openxmlformats.org/drawingml/2006/diagram" xmlns:c="http://schemas.openxmlformats.org/drawingml/2006/chart" xmlns:mv="urn:schemas-microsoft-com:mac:vml" xmlns:mc="http://schemas.openxmlformats.org/markup-compatibility/2006" xmlns="">
         <p15:guide id="1" orient="horz" pos="2160">
           <p15:clr>
             <a:srgbClr val="000000"/>
@@ -4149,7 +4149,7 @@
     <a:masterClrMapping/>
   </p:clrMapOvr>
   <mc:AlternateContent xmlns:mc="http://schemas.openxmlformats.org/markup-compatibility/2006">
-    <mc:Choice xmlns="" xmlns:mv="urn:schemas-microsoft-com:mac:vml" xmlns:c="http://schemas.openxmlformats.org/drawingml/2006/chart" xmlns:dgm="http://schemas.openxmlformats.org/drawingml/2006/diagram" xmlns:o="urn:schemas-microsoft-com:office:office" xmlns:v="urn:schemas-microsoft-com:vml" xmlns:pvml="urn:schemas-microsoft-com:office:powerpoint" xmlns:com="http://schemas.openxmlformats.org/drawingml/2006/compatibility" xmlns:p14="http://schemas.microsoft.com/office/powerpoint/2010/main" xmlns:p15="http://schemas.microsoft.com/office/powerpoint/2012/main" Requires="p14">
+    <mc:Choice xmlns:p15="http://schemas.microsoft.com/office/powerpoint/2012/main" xmlns:p14="http://schemas.microsoft.com/office/powerpoint/2010/main" xmlns:com="http://schemas.openxmlformats.org/drawingml/2006/compatibility" xmlns:pvml="urn:schemas-microsoft-com:office:powerpoint" xmlns:v="urn:schemas-microsoft-com:vml" xmlns:o="urn:schemas-microsoft-com:office:office" xmlns:dgm="http://schemas.openxmlformats.org/drawingml/2006/diagram" xmlns:c="http://schemas.openxmlformats.org/drawingml/2006/chart" xmlns:mv="urn:schemas-microsoft-com:mac:vml" xmlns="" Requires="p14">
       <p:transition spd="slow" p14:dur="1600">
         <p14:gallery dir="l"/>
       </p:transition>
@@ -5116,7 +5116,7 @@
     <a:masterClrMapping/>
   </p:clrMapOvr>
   <mc:AlternateContent xmlns:mc="http://schemas.openxmlformats.org/markup-compatibility/2006">
-    <mc:Choice xmlns="" xmlns:mv="urn:schemas-microsoft-com:mac:vml" xmlns:c="http://schemas.openxmlformats.org/drawingml/2006/chart" xmlns:dgm="http://schemas.openxmlformats.org/drawingml/2006/diagram" xmlns:o="urn:schemas-microsoft-com:office:office" xmlns:v="urn:schemas-microsoft-com:vml" xmlns:pvml="urn:schemas-microsoft-com:office:powerpoint" xmlns:com="http://schemas.openxmlformats.org/drawingml/2006/compatibility" xmlns:p14="http://schemas.microsoft.com/office/powerpoint/2010/main" xmlns:p15="http://schemas.microsoft.com/office/powerpoint/2012/main" Requires="p14">
+    <mc:Choice xmlns:p15="http://schemas.microsoft.com/office/powerpoint/2012/main" xmlns:p14="http://schemas.microsoft.com/office/powerpoint/2010/main" xmlns:com="http://schemas.openxmlformats.org/drawingml/2006/compatibility" xmlns:pvml="urn:schemas-microsoft-com:office:powerpoint" xmlns:v="urn:schemas-microsoft-com:vml" xmlns:o="urn:schemas-microsoft-com:office:office" xmlns:dgm="http://schemas.openxmlformats.org/drawingml/2006/diagram" xmlns:c="http://schemas.openxmlformats.org/drawingml/2006/chart" xmlns:mv="urn:schemas-microsoft-com:mac:vml" xmlns="" Requires="p14">
       <p:transition spd="slow" p14:dur="1600">
         <p14:gallery dir="l"/>
       </p:transition>
@@ -6083,7 +6083,7 @@
     <a:masterClrMapping/>
   </p:clrMapOvr>
   <mc:AlternateContent xmlns:mc="http://schemas.openxmlformats.org/markup-compatibility/2006">
-    <mc:Choice xmlns="" xmlns:mv="urn:schemas-microsoft-com:mac:vml" xmlns:c="http://schemas.openxmlformats.org/drawingml/2006/chart" xmlns:dgm="http://schemas.openxmlformats.org/drawingml/2006/diagram" xmlns:o="urn:schemas-microsoft-com:office:office" xmlns:v="urn:schemas-microsoft-com:vml" xmlns:pvml="urn:schemas-microsoft-com:office:powerpoint" xmlns:com="http://schemas.openxmlformats.org/drawingml/2006/compatibility" xmlns:p14="http://schemas.microsoft.com/office/powerpoint/2010/main" xmlns:p15="http://schemas.microsoft.com/office/powerpoint/2012/main" Requires="p14">
+    <mc:Choice xmlns:p15="http://schemas.microsoft.com/office/powerpoint/2012/main" xmlns:p14="http://schemas.microsoft.com/office/powerpoint/2010/main" xmlns:com="http://schemas.openxmlformats.org/drawingml/2006/compatibility" xmlns:pvml="urn:schemas-microsoft-com:office:powerpoint" xmlns:v="urn:schemas-microsoft-com:vml" xmlns:o="urn:schemas-microsoft-com:office:office" xmlns:dgm="http://schemas.openxmlformats.org/drawingml/2006/diagram" xmlns:c="http://schemas.openxmlformats.org/drawingml/2006/chart" xmlns:mv="urn:schemas-microsoft-com:mac:vml" xmlns="" Requires="p14">
       <p:transition spd="slow" p14:dur="1600">
         <p14:gallery dir="l"/>
       </p:transition>
@@ -6890,7 +6890,7 @@
     <a:masterClrMapping/>
   </p:clrMapOvr>
   <mc:AlternateContent xmlns:mc="http://schemas.openxmlformats.org/markup-compatibility/2006">
-    <mc:Choice xmlns="" xmlns:mv="urn:schemas-microsoft-com:mac:vml" xmlns:c="http://schemas.openxmlformats.org/drawingml/2006/chart" xmlns:dgm="http://schemas.openxmlformats.org/drawingml/2006/diagram" xmlns:o="urn:schemas-microsoft-com:office:office" xmlns:v="urn:schemas-microsoft-com:vml" xmlns:pvml="urn:schemas-microsoft-com:office:powerpoint" xmlns:com="http://schemas.openxmlformats.org/drawingml/2006/compatibility" xmlns:p14="http://schemas.microsoft.com/office/powerpoint/2010/main" xmlns:p15="http://schemas.microsoft.com/office/powerpoint/2012/main" Requires="p14">
+    <mc:Choice xmlns:p15="http://schemas.microsoft.com/office/powerpoint/2012/main" xmlns:p14="http://schemas.microsoft.com/office/powerpoint/2010/main" xmlns:com="http://schemas.openxmlformats.org/drawingml/2006/compatibility" xmlns:pvml="urn:schemas-microsoft-com:office:powerpoint" xmlns:v="urn:schemas-microsoft-com:vml" xmlns:o="urn:schemas-microsoft-com:office:office" xmlns:dgm="http://schemas.openxmlformats.org/drawingml/2006/diagram" xmlns:c="http://schemas.openxmlformats.org/drawingml/2006/chart" xmlns:mv="urn:schemas-microsoft-com:mac:vml" xmlns="" Requires="p14">
       <p:transition spd="slow" p14:dur="1600">
         <p14:gallery dir="l"/>
       </p:transition>
@@ -8177,7 +8177,7 @@
     <a:masterClrMapping/>
   </p:clrMapOvr>
   <mc:AlternateContent xmlns:mc="http://schemas.openxmlformats.org/markup-compatibility/2006">
-    <mc:Choice xmlns="" xmlns:mv="urn:schemas-microsoft-com:mac:vml" xmlns:c="http://schemas.openxmlformats.org/drawingml/2006/chart" xmlns:dgm="http://schemas.openxmlformats.org/drawingml/2006/diagram" xmlns:o="urn:schemas-microsoft-com:office:office" xmlns:v="urn:schemas-microsoft-com:vml" xmlns:pvml="urn:schemas-microsoft-com:office:powerpoint" xmlns:com="http://schemas.openxmlformats.org/drawingml/2006/compatibility" xmlns:p14="http://schemas.microsoft.com/office/powerpoint/2010/main" xmlns:p15="http://schemas.microsoft.com/office/powerpoint/2012/main" Requires="p14">
+    <mc:Choice xmlns:p15="http://schemas.microsoft.com/office/powerpoint/2012/main" xmlns:p14="http://schemas.microsoft.com/office/powerpoint/2010/main" xmlns:com="http://schemas.openxmlformats.org/drawingml/2006/compatibility" xmlns:pvml="urn:schemas-microsoft-com:office:powerpoint" xmlns:v="urn:schemas-microsoft-com:vml" xmlns:o="urn:schemas-microsoft-com:office:office" xmlns:dgm="http://schemas.openxmlformats.org/drawingml/2006/diagram" xmlns:c="http://schemas.openxmlformats.org/drawingml/2006/chart" xmlns:mv="urn:schemas-microsoft-com:mac:vml" xmlns="" Requires="p14">
       <p:transition spd="slow" p14:dur="1600">
         <p14:gallery dir="l"/>
       </p:transition>
@@ -9412,7 +9412,7 @@
     <a:masterClrMapping/>
   </p:clrMapOvr>
   <mc:AlternateContent xmlns:mc="http://schemas.openxmlformats.org/markup-compatibility/2006">
-    <mc:Choice xmlns="" xmlns:mv="urn:schemas-microsoft-com:mac:vml" xmlns:c="http://schemas.openxmlformats.org/drawingml/2006/chart" xmlns:dgm="http://schemas.openxmlformats.org/drawingml/2006/diagram" xmlns:o="urn:schemas-microsoft-com:office:office" xmlns:v="urn:schemas-microsoft-com:vml" xmlns:pvml="urn:schemas-microsoft-com:office:powerpoint" xmlns:com="http://schemas.openxmlformats.org/drawingml/2006/compatibility" xmlns:p14="http://schemas.microsoft.com/office/powerpoint/2010/main" xmlns:p15="http://schemas.microsoft.com/office/powerpoint/2012/main" Requires="p14">
+    <mc:Choice xmlns:p15="http://schemas.microsoft.com/office/powerpoint/2012/main" xmlns:p14="http://schemas.microsoft.com/office/powerpoint/2010/main" xmlns:com="http://schemas.openxmlformats.org/drawingml/2006/compatibility" xmlns:pvml="urn:schemas-microsoft-com:office:powerpoint" xmlns:v="urn:schemas-microsoft-com:vml" xmlns:o="urn:schemas-microsoft-com:office:office" xmlns:dgm="http://schemas.openxmlformats.org/drawingml/2006/diagram" xmlns:c="http://schemas.openxmlformats.org/drawingml/2006/chart" xmlns:mv="urn:schemas-microsoft-com:mac:vml" xmlns="" Requires="p14">
       <p:transition spd="slow" p14:dur="1600">
         <p14:gallery dir="l"/>
       </p:transition>
@@ -10406,7 +10406,7 @@
     <a:masterClrMapping/>
   </p:clrMapOvr>
   <mc:AlternateContent xmlns:mc="http://schemas.openxmlformats.org/markup-compatibility/2006">
-    <mc:Choice xmlns="" xmlns:mv="urn:schemas-microsoft-com:mac:vml" xmlns:c="http://schemas.openxmlformats.org/drawingml/2006/chart" xmlns:dgm="http://schemas.openxmlformats.org/drawingml/2006/diagram" xmlns:o="urn:schemas-microsoft-com:office:office" xmlns:v="urn:schemas-microsoft-com:vml" xmlns:pvml="urn:schemas-microsoft-com:office:powerpoint" xmlns:com="http://schemas.openxmlformats.org/drawingml/2006/compatibility" xmlns:p14="http://schemas.microsoft.com/office/powerpoint/2010/main" xmlns:p15="http://schemas.microsoft.com/office/powerpoint/2012/main" Requires="p14">
+    <mc:Choice xmlns:p15="http://schemas.microsoft.com/office/powerpoint/2012/main" xmlns:p14="http://schemas.microsoft.com/office/powerpoint/2010/main" xmlns:com="http://schemas.openxmlformats.org/drawingml/2006/compatibility" xmlns:pvml="urn:schemas-microsoft-com:office:powerpoint" xmlns:v="urn:schemas-microsoft-com:vml" xmlns:o="urn:schemas-microsoft-com:office:office" xmlns:dgm="http://schemas.openxmlformats.org/drawingml/2006/diagram" xmlns:c="http://schemas.openxmlformats.org/drawingml/2006/chart" xmlns:mv="urn:schemas-microsoft-com:mac:vml" xmlns="" Requires="p14">
       <p:transition spd="slow" p14:dur="1600">
         <p14:gallery dir="l"/>
       </p:transition>
@@ -11373,7 +11373,7 @@
     <a:masterClrMapping/>
   </p:clrMapOvr>
   <mc:AlternateContent xmlns:mc="http://schemas.openxmlformats.org/markup-compatibility/2006">
-    <mc:Choice xmlns="" xmlns:mv="urn:schemas-microsoft-com:mac:vml" xmlns:c="http://schemas.openxmlformats.org/drawingml/2006/chart" xmlns:dgm="http://schemas.openxmlformats.org/drawingml/2006/diagram" xmlns:o="urn:schemas-microsoft-com:office:office" xmlns:v="urn:schemas-microsoft-com:vml" xmlns:pvml="urn:schemas-microsoft-com:office:powerpoint" xmlns:com="http://schemas.openxmlformats.org/drawingml/2006/compatibility" xmlns:p14="http://schemas.microsoft.com/office/powerpoint/2010/main" xmlns:p15="http://schemas.microsoft.com/office/powerpoint/2012/main" Requires="p14">
+    <mc:Choice xmlns:p15="http://schemas.microsoft.com/office/powerpoint/2012/main" xmlns:p14="http://schemas.microsoft.com/office/powerpoint/2010/main" xmlns:com="http://schemas.openxmlformats.org/drawingml/2006/compatibility" xmlns:pvml="urn:schemas-microsoft-com:office:powerpoint" xmlns:v="urn:schemas-microsoft-com:vml" xmlns:o="urn:schemas-microsoft-com:office:office" xmlns:dgm="http://schemas.openxmlformats.org/drawingml/2006/diagram" xmlns:c="http://schemas.openxmlformats.org/drawingml/2006/chart" xmlns:mv="urn:schemas-microsoft-com:mac:vml" xmlns="" Requires="p14">
       <p:transition spd="slow" p14:dur="1600">
         <p14:gallery dir="l"/>
       </p:transition>
@@ -12500,7 +12500,7 @@
     <a:masterClrMapping/>
   </p:clrMapOvr>
   <mc:AlternateContent xmlns:mc="http://schemas.openxmlformats.org/markup-compatibility/2006">
-    <mc:Choice xmlns="" xmlns:mv="urn:schemas-microsoft-com:mac:vml" xmlns:c="http://schemas.openxmlformats.org/drawingml/2006/chart" xmlns:dgm="http://schemas.openxmlformats.org/drawingml/2006/diagram" xmlns:o="urn:schemas-microsoft-com:office:office" xmlns:v="urn:schemas-microsoft-com:vml" xmlns:pvml="urn:schemas-microsoft-com:office:powerpoint" xmlns:com="http://schemas.openxmlformats.org/drawingml/2006/compatibility" xmlns:p14="http://schemas.microsoft.com/office/powerpoint/2010/main" xmlns:p15="http://schemas.microsoft.com/office/powerpoint/2012/main" Requires="p14">
+    <mc:Choice xmlns:p15="http://schemas.microsoft.com/office/powerpoint/2012/main" xmlns:p14="http://schemas.microsoft.com/office/powerpoint/2010/main" xmlns:com="http://schemas.openxmlformats.org/drawingml/2006/compatibility" xmlns:pvml="urn:schemas-microsoft-com:office:powerpoint" xmlns:v="urn:schemas-microsoft-com:vml" xmlns:o="urn:schemas-microsoft-com:office:office" xmlns:dgm="http://schemas.openxmlformats.org/drawingml/2006/diagram" xmlns:c="http://schemas.openxmlformats.org/drawingml/2006/chart" xmlns:mv="urn:schemas-microsoft-com:mac:vml" xmlns="" Requires="p14">
       <p:transition spd="slow" p14:dur="1600">
         <p14:gallery dir="l"/>
       </p:transition>
@@ -13947,7 +13947,7 @@
     <a:masterClrMapping/>
   </p:clrMapOvr>
   <mc:AlternateContent xmlns:mc="http://schemas.openxmlformats.org/markup-compatibility/2006">
-    <mc:Choice xmlns="" xmlns:mv="urn:schemas-microsoft-com:mac:vml" xmlns:c="http://schemas.openxmlformats.org/drawingml/2006/chart" xmlns:dgm="http://schemas.openxmlformats.org/drawingml/2006/diagram" xmlns:o="urn:schemas-microsoft-com:office:office" xmlns:v="urn:schemas-microsoft-com:vml" xmlns:pvml="urn:schemas-microsoft-com:office:powerpoint" xmlns:com="http://schemas.openxmlformats.org/drawingml/2006/compatibility" xmlns:p14="http://schemas.microsoft.com/office/powerpoint/2010/main" xmlns:p15="http://schemas.microsoft.com/office/powerpoint/2012/main" Requires="p14">
+    <mc:Choice xmlns:p15="http://schemas.microsoft.com/office/powerpoint/2012/main" xmlns:p14="http://schemas.microsoft.com/office/powerpoint/2010/main" xmlns:com="http://schemas.openxmlformats.org/drawingml/2006/compatibility" xmlns:pvml="urn:schemas-microsoft-com:office:powerpoint" xmlns:v="urn:schemas-microsoft-com:vml" xmlns:o="urn:schemas-microsoft-com:office:office" xmlns:dgm="http://schemas.openxmlformats.org/drawingml/2006/diagram" xmlns:c="http://schemas.openxmlformats.org/drawingml/2006/chart" xmlns:mv="urn:schemas-microsoft-com:mac:vml" xmlns="" Requires="p14">
       <p:transition spd="slow" p14:dur="1600">
         <p14:gallery dir="l"/>
       </p:transition>
@@ -14754,7 +14754,7 @@
     <a:masterClrMapping/>
   </p:clrMapOvr>
   <mc:AlternateContent xmlns:mc="http://schemas.openxmlformats.org/markup-compatibility/2006">
-    <mc:Choice xmlns="" xmlns:mv="urn:schemas-microsoft-com:mac:vml" xmlns:c="http://schemas.openxmlformats.org/drawingml/2006/chart" xmlns:dgm="http://schemas.openxmlformats.org/drawingml/2006/diagram" xmlns:o="urn:schemas-microsoft-com:office:office" xmlns:v="urn:schemas-microsoft-com:vml" xmlns:pvml="urn:schemas-microsoft-com:office:powerpoint" xmlns:com="http://schemas.openxmlformats.org/drawingml/2006/compatibility" xmlns:p14="http://schemas.microsoft.com/office/powerpoint/2010/main" xmlns:p15="http://schemas.microsoft.com/office/powerpoint/2012/main" Requires="p14">
+    <mc:Choice xmlns:p15="http://schemas.microsoft.com/office/powerpoint/2012/main" xmlns:p14="http://schemas.microsoft.com/office/powerpoint/2010/main" xmlns:com="http://schemas.openxmlformats.org/drawingml/2006/compatibility" xmlns:pvml="urn:schemas-microsoft-com:office:powerpoint" xmlns:v="urn:schemas-microsoft-com:vml" xmlns:o="urn:schemas-microsoft-com:office:office" xmlns:dgm="http://schemas.openxmlformats.org/drawingml/2006/diagram" xmlns:c="http://schemas.openxmlformats.org/drawingml/2006/chart" xmlns:mv="urn:schemas-microsoft-com:mac:vml" xmlns="" Requires="p14">
       <p:transition spd="slow" p14:dur="1600">
         <p14:gallery dir="l"/>
       </p:transition>
@@ -15428,7 +15428,7 @@
     <a:masterClrMapping/>
   </p:clrMapOvr>
   <mc:AlternateContent xmlns:mc="http://schemas.openxmlformats.org/markup-compatibility/2006">
-    <mc:Choice xmlns="" xmlns:mv="urn:schemas-microsoft-com:mac:vml" xmlns:c="http://schemas.openxmlformats.org/drawingml/2006/chart" xmlns:dgm="http://schemas.openxmlformats.org/drawingml/2006/diagram" xmlns:o="urn:schemas-microsoft-com:office:office" xmlns:v="urn:schemas-microsoft-com:vml" xmlns:pvml="urn:schemas-microsoft-com:office:powerpoint" xmlns:com="http://schemas.openxmlformats.org/drawingml/2006/compatibility" xmlns:p14="http://schemas.microsoft.com/office/powerpoint/2010/main" xmlns:p15="http://schemas.microsoft.com/office/powerpoint/2012/main" Requires="p14">
+    <mc:Choice xmlns:p15="http://schemas.microsoft.com/office/powerpoint/2012/main" xmlns:p14="http://schemas.microsoft.com/office/powerpoint/2010/main" xmlns:com="http://schemas.openxmlformats.org/drawingml/2006/compatibility" xmlns:pvml="urn:schemas-microsoft-com:office:powerpoint" xmlns:v="urn:schemas-microsoft-com:vml" xmlns:o="urn:schemas-microsoft-com:office:office" xmlns:dgm="http://schemas.openxmlformats.org/drawingml/2006/diagram" xmlns:c="http://schemas.openxmlformats.org/drawingml/2006/chart" xmlns:mv="urn:schemas-microsoft-com:mac:vml" xmlns="" Requires="p14">
       <p:transition spd="slow" p14:dur="1600">
         <p14:gallery dir="l"/>
       </p:transition>
@@ -16555,7 +16555,7 @@
     <a:masterClrMapping/>
   </p:clrMapOvr>
   <mc:AlternateContent xmlns:mc="http://schemas.openxmlformats.org/markup-compatibility/2006">
-    <mc:Choice xmlns="" xmlns:mv="urn:schemas-microsoft-com:mac:vml" xmlns:c="http://schemas.openxmlformats.org/drawingml/2006/chart" xmlns:dgm="http://schemas.openxmlformats.org/drawingml/2006/diagram" xmlns:o="urn:schemas-microsoft-com:office:office" xmlns:v="urn:schemas-microsoft-com:vml" xmlns:pvml="urn:schemas-microsoft-com:office:powerpoint" xmlns:com="http://schemas.openxmlformats.org/drawingml/2006/compatibility" xmlns:p14="http://schemas.microsoft.com/office/powerpoint/2010/main" xmlns:p15="http://schemas.microsoft.com/office/powerpoint/2012/main" Requires="p14">
+    <mc:Choice xmlns:p15="http://schemas.microsoft.com/office/powerpoint/2012/main" xmlns:p14="http://schemas.microsoft.com/office/powerpoint/2010/main" xmlns:com="http://schemas.openxmlformats.org/drawingml/2006/compatibility" xmlns:pvml="urn:schemas-microsoft-com:office:powerpoint" xmlns:v="urn:schemas-microsoft-com:vml" xmlns:o="urn:schemas-microsoft-com:office:office" xmlns:dgm="http://schemas.openxmlformats.org/drawingml/2006/diagram" xmlns:c="http://schemas.openxmlformats.org/drawingml/2006/chart" xmlns:mv="urn:schemas-microsoft-com:mac:vml" xmlns="" Requires="p14">
       <p:transition spd="slow" p14:dur="1600">
         <p14:gallery dir="l"/>
       </p:transition>
@@ -17790,7 +17790,7 @@
     <a:masterClrMapping/>
   </p:clrMapOvr>
   <mc:AlternateContent xmlns:mc="http://schemas.openxmlformats.org/markup-compatibility/2006">
-    <mc:Choice xmlns="" xmlns:mv="urn:schemas-microsoft-com:mac:vml" xmlns:c="http://schemas.openxmlformats.org/drawingml/2006/chart" xmlns:dgm="http://schemas.openxmlformats.org/drawingml/2006/diagram" xmlns:o="urn:schemas-microsoft-com:office:office" xmlns:v="urn:schemas-microsoft-com:vml" xmlns:pvml="urn:schemas-microsoft-com:office:powerpoint" xmlns:com="http://schemas.openxmlformats.org/drawingml/2006/compatibility" xmlns:p14="http://schemas.microsoft.com/office/powerpoint/2010/main" xmlns:p15="http://schemas.microsoft.com/office/powerpoint/2012/main" Requires="p14">
+    <mc:Choice xmlns:p15="http://schemas.microsoft.com/office/powerpoint/2012/main" xmlns:p14="http://schemas.microsoft.com/office/powerpoint/2010/main" xmlns:com="http://schemas.openxmlformats.org/drawingml/2006/compatibility" xmlns:pvml="urn:schemas-microsoft-com:office:powerpoint" xmlns:v="urn:schemas-microsoft-com:vml" xmlns:o="urn:schemas-microsoft-com:office:office" xmlns:dgm="http://schemas.openxmlformats.org/drawingml/2006/diagram" xmlns:c="http://schemas.openxmlformats.org/drawingml/2006/chart" xmlns:mv="urn:schemas-microsoft-com:mac:vml" xmlns="" Requires="p14">
       <p:transition spd="slow" p14:dur="1600">
         <p14:gallery dir="l"/>
       </p:transition>
@@ -19314,7 +19314,7 @@
     <p:sldLayoutId id="2147483661" r:id="rId14"/>
   </p:sldLayoutIdLst>
   <mc:AlternateContent xmlns:mc="http://schemas.openxmlformats.org/markup-compatibility/2006">
-    <mc:Choice xmlns="" xmlns:mv="urn:schemas-microsoft-com:mac:vml" xmlns:c="http://schemas.openxmlformats.org/drawingml/2006/chart" xmlns:dgm="http://schemas.openxmlformats.org/drawingml/2006/diagram" xmlns:o="urn:schemas-microsoft-com:office:office" xmlns:v="urn:schemas-microsoft-com:vml" xmlns:pvml="urn:schemas-microsoft-com:office:powerpoint" xmlns:com="http://schemas.openxmlformats.org/drawingml/2006/compatibility" xmlns:p14="http://schemas.microsoft.com/office/powerpoint/2010/main" xmlns:p15="http://schemas.microsoft.com/office/powerpoint/2012/main" Requires="p14">
+    <mc:Choice xmlns:p15="http://schemas.microsoft.com/office/powerpoint/2012/main" xmlns:p14="http://schemas.microsoft.com/office/powerpoint/2010/main" xmlns:com="http://schemas.openxmlformats.org/drawingml/2006/compatibility" xmlns:pvml="urn:schemas-microsoft-com:office:powerpoint" xmlns:v="urn:schemas-microsoft-com:vml" xmlns:o="urn:schemas-microsoft-com:office:office" xmlns:dgm="http://schemas.openxmlformats.org/drawingml/2006/diagram" xmlns:c="http://schemas.openxmlformats.org/drawingml/2006/chart" xmlns:mv="urn:schemas-microsoft-com:mac:vml" xmlns="" Requires="p14">
       <p:transition spd="slow" p14:dur="1600">
         <p14:gallery dir="l"/>
       </p:transition>
@@ -20078,13 +20078,31 @@
               <a:buNone/>
             </a:pPr>
             <a:r>
-              <a:rPr lang="en-US" sz="5400">
+              <a:rPr lang="en-US" sz="5400" dirty="0" err="1" smtClean="0">
                 <a:latin typeface="Times New Roman"/>
                 <a:ea typeface="Times New Roman"/>
                 <a:cs typeface="Times New Roman"/>
                 <a:sym typeface="Times New Roman"/>
               </a:rPr>
-              <a:t>Library Auditing System</a:t>
+              <a:t>QRCode</a:t>
+            </a:r>
+            <a:r>
+              <a:rPr lang="en-US" sz="5400" dirty="0" smtClean="0">
+                <a:latin typeface="Times New Roman"/>
+                <a:ea typeface="Times New Roman"/>
+                <a:cs typeface="Times New Roman"/>
+                <a:sym typeface="Times New Roman"/>
+              </a:rPr>
+              <a:t> based Library </a:t>
+            </a:r>
+            <a:r>
+              <a:rPr lang="en-US" sz="5400" dirty="0">
+                <a:latin typeface="Times New Roman"/>
+                <a:ea typeface="Times New Roman"/>
+                <a:cs typeface="Times New Roman"/>
+                <a:sym typeface="Times New Roman"/>
+              </a:rPr>
+              <a:t>Auditing System</a:t>
             </a:r>
             <a:endParaRPr/>
           </a:p>
@@ -20559,7 +20577,7 @@
     <a:masterClrMapping/>
   </p:clrMapOvr>
   <mc:AlternateContent xmlns:mc="http://schemas.openxmlformats.org/markup-compatibility/2006">
-    <mc:Choice xmlns="" xmlns:mv="urn:schemas-microsoft-com:mac:vml" xmlns:c="http://schemas.openxmlformats.org/drawingml/2006/chart" xmlns:dgm="http://schemas.openxmlformats.org/drawingml/2006/diagram" xmlns:o="urn:schemas-microsoft-com:office:office" xmlns:v="urn:schemas-microsoft-com:vml" xmlns:pvml="urn:schemas-microsoft-com:office:powerpoint" xmlns:com="http://schemas.openxmlformats.org/drawingml/2006/compatibility" xmlns:p14="http://schemas.microsoft.com/office/powerpoint/2010/main" xmlns:p15="http://schemas.microsoft.com/office/powerpoint/2012/main" Requires="p14">
+    <mc:Choice xmlns:p15="http://schemas.microsoft.com/office/powerpoint/2012/main" xmlns:p14="http://schemas.microsoft.com/office/powerpoint/2010/main" xmlns:com="http://schemas.openxmlformats.org/drawingml/2006/compatibility" xmlns:pvml="urn:schemas-microsoft-com:office:powerpoint" xmlns:v="urn:schemas-microsoft-com:vml" xmlns:o="urn:schemas-microsoft-com:office:office" xmlns:dgm="http://schemas.openxmlformats.org/drawingml/2006/diagram" xmlns:c="http://schemas.openxmlformats.org/drawingml/2006/chart" xmlns:mv="urn:schemas-microsoft-com:mac:vml" xmlns="" Requires="p14">
       <p:transition spd="slow" p14:dur="2000">
         <p14:gallery dir="l"/>
       </p:transition>
@@ -20711,11 +20729,7 @@
           <a:p>
             <a:r>
               <a:rPr lang="en-US" sz="2400" dirty="0" smtClean="0"/>
-              <a:t>Difference between</a:t>
-            </a:r>
-            <a:r>
-              <a:rPr lang="en-US" sz="2400" dirty="0" smtClean="0"/>
-              <a:t> </a:t>
+              <a:t>Difference between </a:t>
             </a:r>
             <a:r>
               <a:rPr lang="en-US" sz="2400" dirty="0" err="1" smtClean="0"/>
@@ -20723,15 +20737,7 @@
             </a:r>
             <a:r>
               <a:rPr lang="en-US" sz="2400" dirty="0" smtClean="0"/>
-              <a:t> </a:t>
-            </a:r>
-            <a:r>
-              <a:rPr lang="en-US" sz="2400" dirty="0" smtClean="0"/>
-              <a:t>and</a:t>
-            </a:r>
-            <a:r>
-              <a:rPr lang="en-US" sz="2400" dirty="0" smtClean="0"/>
-              <a:t> </a:t>
+              <a:t> and </a:t>
             </a:r>
             <a:r>
               <a:rPr lang="en-US" sz="2400" dirty="0" err="1" smtClean="0"/>
@@ -20807,7 +20813,7 @@
     <a:masterClrMapping/>
   </p:clrMapOvr>
   <mc:AlternateContent xmlns:mc="http://schemas.openxmlformats.org/markup-compatibility/2006">
-    <mc:Choice xmlns="" xmlns:mv="urn:schemas-microsoft-com:mac:vml" xmlns:c="http://schemas.openxmlformats.org/drawingml/2006/chart" xmlns:dgm="http://schemas.openxmlformats.org/drawingml/2006/diagram" xmlns:o="urn:schemas-microsoft-com:office:office" xmlns:v="urn:schemas-microsoft-com:vml" xmlns:pvml="urn:schemas-microsoft-com:office:powerpoint" xmlns:com="http://schemas.openxmlformats.org/drawingml/2006/compatibility" xmlns:p14="http://schemas.microsoft.com/office/powerpoint/2010/main" xmlns:p15="http://schemas.microsoft.com/office/powerpoint/2012/main" Requires="p14">
+    <mc:Choice xmlns:p15="http://schemas.microsoft.com/office/powerpoint/2012/main" xmlns:p14="http://schemas.microsoft.com/office/powerpoint/2010/main" xmlns:com="http://schemas.openxmlformats.org/drawingml/2006/compatibility" xmlns:pvml="urn:schemas-microsoft-com:office:powerpoint" xmlns:v="urn:schemas-microsoft-com:vml" xmlns:o="urn:schemas-microsoft-com:office:office" xmlns:dgm="http://schemas.openxmlformats.org/drawingml/2006/diagram" xmlns:c="http://schemas.openxmlformats.org/drawingml/2006/chart" xmlns:mv="urn:schemas-microsoft-com:mac:vml" xmlns="" Requires="p14">
       <p:transition spd="slow" p14:dur="1600">
         <p14:gallery dir="l"/>
       </p:transition>
@@ -21025,7 +21031,7 @@
     <a:masterClrMapping/>
   </p:clrMapOvr>
   <mc:AlternateContent xmlns:mc="http://schemas.openxmlformats.org/markup-compatibility/2006">
-    <mc:Choice xmlns="" xmlns:mv="urn:schemas-microsoft-com:mac:vml" xmlns:c="http://schemas.openxmlformats.org/drawingml/2006/chart" xmlns:dgm="http://schemas.openxmlformats.org/drawingml/2006/diagram" xmlns:o="urn:schemas-microsoft-com:office:office" xmlns:v="urn:schemas-microsoft-com:vml" xmlns:pvml="urn:schemas-microsoft-com:office:powerpoint" xmlns:com="http://schemas.openxmlformats.org/drawingml/2006/compatibility" xmlns:p14="http://schemas.microsoft.com/office/powerpoint/2010/main" xmlns:p15="http://schemas.microsoft.com/office/powerpoint/2012/main" Requires="p14">
+    <mc:Choice xmlns:p15="http://schemas.microsoft.com/office/powerpoint/2012/main" xmlns:p14="http://schemas.microsoft.com/office/powerpoint/2010/main" xmlns:com="http://schemas.openxmlformats.org/drawingml/2006/compatibility" xmlns:pvml="urn:schemas-microsoft-com:office:powerpoint" xmlns:v="urn:schemas-microsoft-com:vml" xmlns:o="urn:schemas-microsoft-com:office:office" xmlns:dgm="http://schemas.openxmlformats.org/drawingml/2006/diagram" xmlns:c="http://schemas.openxmlformats.org/drawingml/2006/chart" xmlns:mv="urn:schemas-microsoft-com:mac:vml" xmlns="" Requires="p14">
       <p:transition spd="med">
         <p14:gallery dir="l"/>
       </p:transition>
@@ -21245,7 +21251,7 @@
     <a:masterClrMapping/>
   </p:clrMapOvr>
   <mc:AlternateContent xmlns:mc="http://schemas.openxmlformats.org/markup-compatibility/2006">
-    <mc:Choice xmlns="" xmlns:mv="urn:schemas-microsoft-com:mac:vml" xmlns:c="http://schemas.openxmlformats.org/drawingml/2006/chart" xmlns:dgm="http://schemas.openxmlformats.org/drawingml/2006/diagram" xmlns:o="urn:schemas-microsoft-com:office:office" xmlns:v="urn:schemas-microsoft-com:vml" xmlns:pvml="urn:schemas-microsoft-com:office:powerpoint" xmlns:com="http://schemas.openxmlformats.org/drawingml/2006/compatibility" xmlns:p14="http://schemas.microsoft.com/office/powerpoint/2010/main" xmlns:p15="http://schemas.microsoft.com/office/powerpoint/2012/main" Requires="p14">
+    <mc:Choice xmlns:p15="http://schemas.microsoft.com/office/powerpoint/2012/main" xmlns:p14="http://schemas.microsoft.com/office/powerpoint/2010/main" xmlns:com="http://schemas.openxmlformats.org/drawingml/2006/compatibility" xmlns:pvml="urn:schemas-microsoft-com:office:powerpoint" xmlns:v="urn:schemas-microsoft-com:vml" xmlns:o="urn:schemas-microsoft-com:office:office" xmlns:dgm="http://schemas.openxmlformats.org/drawingml/2006/diagram" xmlns:c="http://schemas.openxmlformats.org/drawingml/2006/chart" xmlns:mv="urn:schemas-microsoft-com:mac:vml" xmlns="" Requires="p14">
       <p:transition spd="slow" p14:dur="1600">
         <p14:gallery dir="l"/>
       </p:transition>
@@ -21458,7 +21464,7 @@
     <a:masterClrMapping/>
   </p:clrMapOvr>
   <mc:AlternateContent xmlns:mc="http://schemas.openxmlformats.org/markup-compatibility/2006">
-    <mc:Choice xmlns="" xmlns:mv="urn:schemas-microsoft-com:mac:vml" xmlns:c="http://schemas.openxmlformats.org/drawingml/2006/chart" xmlns:dgm="http://schemas.openxmlformats.org/drawingml/2006/diagram" xmlns:o="urn:schemas-microsoft-com:office:office" xmlns:v="urn:schemas-microsoft-com:vml" xmlns:pvml="urn:schemas-microsoft-com:office:powerpoint" xmlns:com="http://schemas.openxmlformats.org/drawingml/2006/compatibility" xmlns:p14="http://schemas.microsoft.com/office/powerpoint/2010/main" xmlns:p15="http://schemas.microsoft.com/office/powerpoint/2012/main" Requires="p14">
+    <mc:Choice xmlns:p15="http://schemas.microsoft.com/office/powerpoint/2012/main" xmlns:p14="http://schemas.microsoft.com/office/powerpoint/2010/main" xmlns:com="http://schemas.openxmlformats.org/drawingml/2006/compatibility" xmlns:pvml="urn:schemas-microsoft-com:office:powerpoint" xmlns:v="urn:schemas-microsoft-com:vml" xmlns:o="urn:schemas-microsoft-com:office:office" xmlns:dgm="http://schemas.openxmlformats.org/drawingml/2006/diagram" xmlns:c="http://schemas.openxmlformats.org/drawingml/2006/chart" xmlns:mv="urn:schemas-microsoft-com:mac:vml" xmlns="" Requires="p14">
       <p:transition spd="slow" p14:dur="1600">
         <p14:gallery dir="l"/>
       </p:transition>
@@ -22611,7 +22617,7 @@
     <a:masterClrMapping/>
   </p:clrMapOvr>
   <mc:AlternateContent xmlns:mc="http://schemas.openxmlformats.org/markup-compatibility/2006">
-    <mc:Choice xmlns="" xmlns:mv="urn:schemas-microsoft-com:mac:vml" xmlns:c="http://schemas.openxmlformats.org/drawingml/2006/chart" xmlns:dgm="http://schemas.openxmlformats.org/drawingml/2006/diagram" xmlns:o="urn:schemas-microsoft-com:office:office" xmlns:v="urn:schemas-microsoft-com:vml" xmlns:pvml="urn:schemas-microsoft-com:office:powerpoint" xmlns:com="http://schemas.openxmlformats.org/drawingml/2006/compatibility" xmlns:p14="http://schemas.microsoft.com/office/powerpoint/2010/main" xmlns:p15="http://schemas.microsoft.com/office/powerpoint/2012/main" Requires="p14">
+    <mc:Choice xmlns:p15="http://schemas.microsoft.com/office/powerpoint/2012/main" xmlns:p14="http://schemas.microsoft.com/office/powerpoint/2010/main" xmlns:com="http://schemas.openxmlformats.org/drawingml/2006/compatibility" xmlns:pvml="urn:schemas-microsoft-com:office:powerpoint" xmlns:v="urn:schemas-microsoft-com:vml" xmlns:o="urn:schemas-microsoft-com:office:office" xmlns:dgm="http://schemas.openxmlformats.org/drawingml/2006/diagram" xmlns:c="http://schemas.openxmlformats.org/drawingml/2006/chart" xmlns:mv="urn:schemas-microsoft-com:mac:vml" xmlns="" Requires="p14">
       <p:transition spd="slow" p14:dur="1600">
         <p14:gallery dir="l"/>
       </p:transition>
@@ -22953,7 +22959,7 @@
     <a:masterClrMapping/>
   </p:clrMapOvr>
   <mc:AlternateContent xmlns:mc="http://schemas.openxmlformats.org/markup-compatibility/2006">
-    <mc:Choice xmlns="" xmlns:mv="urn:schemas-microsoft-com:mac:vml" xmlns:c="http://schemas.openxmlformats.org/drawingml/2006/chart" xmlns:dgm="http://schemas.openxmlformats.org/drawingml/2006/diagram" xmlns:o="urn:schemas-microsoft-com:office:office" xmlns:v="urn:schemas-microsoft-com:vml" xmlns:pvml="urn:schemas-microsoft-com:office:powerpoint" xmlns:com="http://schemas.openxmlformats.org/drawingml/2006/compatibility" xmlns:p14="http://schemas.microsoft.com/office/powerpoint/2010/main" xmlns:p15="http://schemas.microsoft.com/office/powerpoint/2012/main" Requires="p14">
+    <mc:Choice xmlns:p15="http://schemas.microsoft.com/office/powerpoint/2012/main" xmlns:p14="http://schemas.microsoft.com/office/powerpoint/2010/main" xmlns:com="http://schemas.openxmlformats.org/drawingml/2006/compatibility" xmlns:pvml="urn:schemas-microsoft-com:office:powerpoint" xmlns:v="urn:schemas-microsoft-com:vml" xmlns:o="urn:schemas-microsoft-com:office:office" xmlns:dgm="http://schemas.openxmlformats.org/drawingml/2006/diagram" xmlns:c="http://schemas.openxmlformats.org/drawingml/2006/chart" xmlns:mv="urn:schemas-microsoft-com:mac:vml" xmlns="" Requires="p14">
       <p:transition spd="slow" p14:dur="1600">
         <p14:gallery dir="l"/>
       </p:transition>
@@ -23172,11 +23178,7 @@
                       </a:r>
                       <a:r>
                         <a:rPr lang="en-US" dirty="0" smtClean="0"/>
-                        <a:t> scanner and</a:t>
-                      </a:r>
-                      <a:r>
-                        <a:rPr lang="en-US" dirty="0" smtClean="0"/>
-                        <a:t> </a:t>
+                        <a:t> scanner and </a:t>
                       </a:r>
                       <a:r>
                         <a:rPr lang="en-US" dirty="0" err="1" smtClean="0"/>
@@ -23210,11 +23212,7 @@
                     <a:p>
                       <a:r>
                         <a:rPr lang="en-US" dirty="0" smtClean="0"/>
-                        <a:t>Report</a:t>
-                      </a:r>
-                      <a:r>
-                        <a:rPr lang="en-US" dirty="0" smtClean="0"/>
-                        <a:t> generation</a:t>
+                        <a:t>Report generation</a:t>
                       </a:r>
                       <a:endParaRPr lang="en-US" dirty="0"/>
                     </a:p>
@@ -23227,8 +23225,8 @@
                     <a:lstStyle/>
                     <a:p>
                       <a:r>
-                        <a:rPr lang="en-US" dirty="0" smtClean="0"/>
-                        <a:t>05-02-2020</a:t>
+                        <a:rPr lang="en-US" smtClean="0"/>
+                        <a:t>05-03-2020</a:t>
                       </a:r>
                       <a:endParaRPr lang="en-US" dirty="0"/>
                     </a:p>
@@ -23244,11 +23242,7 @@
                     <a:p>
                       <a:r>
                         <a:rPr lang="en-US" dirty="0" smtClean="0"/>
-                        <a:t>Testing</a:t>
-                      </a:r>
-                      <a:r>
-                        <a:rPr lang="en-US" dirty="0" smtClean="0"/>
-                        <a:t> Phase</a:t>
+                        <a:t>Testing Phase</a:t>
                       </a:r>
                       <a:endParaRPr lang="en-US" dirty="0"/>
                     </a:p>
@@ -23278,11 +23272,7 @@
                     <a:p>
                       <a:r>
                         <a:rPr lang="en-US" dirty="0" smtClean="0"/>
-                        <a:t>Document</a:t>
-                      </a:r>
-                      <a:r>
-                        <a:rPr lang="en-US" dirty="0" smtClean="0"/>
-                        <a:t> submission</a:t>
+                        <a:t>Document submission</a:t>
                       </a:r>
                       <a:endParaRPr lang="en-US" dirty="0"/>
                     </a:p>

</xml_diff>

<commit_message>
Modified Abstract for Review_2
</commit_message>
<xml_diff>
--- a/project_abstract (3).pptx
+++ b/project_abstract (3).pptx
@@ -20648,7 +20648,13 @@
             <p:ph type="body" idx="1"/>
           </p:nvPr>
         </p:nvSpPr>
-        <p:spPr/>
+        <p:spPr>
+          <a:ln>
+            <a:solidFill>
+              <a:schemeClr val="accent1"/>
+            </a:solidFill>
+          </a:ln>
+        </p:spPr>
         <p:txBody>
           <a:bodyPr/>
           <a:lstStyle/>
@@ -20665,15 +20671,31 @@
                 <a:latin typeface="Times New Roman" pitchFamily="18" charset="0"/>
                 <a:cs typeface="Times New Roman" pitchFamily="18" charset="0"/>
               </a:rPr>
-              <a:t> :</a:t>
+              <a:t> </a:t>
             </a:r>
             <a:r>
               <a:rPr lang="en-US" sz="2400" dirty="0" smtClean="0">
-                <a:hlinkClick r:id="rId2"/>
+                <a:latin typeface="Times New Roman" pitchFamily="18" charset="0"/>
+                <a:cs typeface="Times New Roman" pitchFamily="18" charset="0"/>
               </a:rPr>
-              <a:t>https://www.fastprint.co.uk/blog/quick-response-codes-what-are-they-and-how-do-they-work.html</a:t>
+              <a:t>:</a:t>
             </a:r>
-            <a:endParaRPr lang="en-US" sz="2400" dirty="0" smtClean="0">
+            <a:r>
+              <a:rPr lang="en-US" sz="2400" u="sng" dirty="0" smtClean="0">
+                <a:solidFill>
+                  <a:schemeClr val="accent1">
+                    <a:lumMod val="75000"/>
+                  </a:schemeClr>
+                </a:solidFill>
+              </a:rPr>
+              <a:t>ieeexplore.ieee.org/document/7966807</a:t>
+            </a:r>
+            <a:endParaRPr lang="en-US" sz="2400" u="sng" dirty="0" smtClean="0">
+              <a:solidFill>
+                <a:schemeClr val="accent1">
+                  <a:lumMod val="75000"/>
+                </a:schemeClr>
+              </a:solidFill>
               <a:latin typeface="Times New Roman" pitchFamily="18" charset="0"/>
               <a:cs typeface="Times New Roman" pitchFamily="18" charset="0"/>
             </a:endParaRPr>
@@ -20702,25 +20724,25 @@
             </a:r>
             <a:r>
               <a:rPr lang="en-US" sz="2400" dirty="0" err="1" smtClean="0">
-                <a:hlinkClick r:id="rId3"/>
+                <a:hlinkClick r:id="rId2"/>
               </a:rPr>
               <a:t>https</a:t>
             </a:r>
             <a:r>
               <a:rPr lang="en-US" sz="2400" dirty="0" smtClean="0">
-                <a:hlinkClick r:id="rId3"/>
+                <a:hlinkClick r:id="rId2"/>
               </a:rPr>
               <a:t>://</a:t>
             </a:r>
             <a:r>
               <a:rPr lang="en-US" sz="2400" dirty="0" err="1" smtClean="0">
-                <a:hlinkClick r:id="rId3"/>
+                <a:hlinkClick r:id="rId2"/>
               </a:rPr>
               <a:t>www.the-qrcode-generator.com</a:t>
             </a:r>
             <a:r>
               <a:rPr lang="en-US" sz="2400" dirty="0" smtClean="0">
-                <a:hlinkClick r:id="rId3"/>
+                <a:hlinkClick r:id="rId2"/>
               </a:rPr>
               <a:t>/</a:t>
             </a:r>
@@ -20745,55 +20767,55 @@
             </a:r>
             <a:r>
               <a:rPr lang="en-US" sz="2400" dirty="0" err="1" smtClean="0">
-                <a:hlinkClick r:id="rId4"/>
+                <a:hlinkClick r:id="rId3"/>
               </a:rPr>
               <a:t>https</a:t>
             </a:r>
             <a:r>
               <a:rPr lang="en-US" sz="2400" dirty="0" smtClean="0">
-                <a:hlinkClick r:id="rId4"/>
+                <a:hlinkClick r:id="rId3"/>
               </a:rPr>
               <a:t>://</a:t>
             </a:r>
             <a:r>
               <a:rPr lang="en-US" sz="2400" dirty="0" err="1" smtClean="0">
-                <a:hlinkClick r:id="rId4"/>
+                <a:hlinkClick r:id="rId3"/>
               </a:rPr>
               <a:t>www.scienceabc.com</a:t>
             </a:r>
             <a:r>
               <a:rPr lang="en-US" sz="2400" dirty="0" smtClean="0">
-                <a:hlinkClick r:id="rId4"/>
+                <a:hlinkClick r:id="rId3"/>
               </a:rPr>
               <a:t>/innovation/</a:t>
             </a:r>
             <a:r>
               <a:rPr lang="en-US" sz="2400" dirty="0" err="1" smtClean="0">
-                <a:hlinkClick r:id="rId4"/>
+                <a:hlinkClick r:id="rId3"/>
               </a:rPr>
               <a:t>whats</a:t>
             </a:r>
             <a:r>
               <a:rPr lang="en-US" sz="2400" dirty="0" smtClean="0">
-                <a:hlinkClick r:id="rId4"/>
+                <a:hlinkClick r:id="rId3"/>
               </a:rPr>
               <a:t>-</a:t>
             </a:r>
             <a:r>
               <a:rPr lang="en-US" sz="2400" dirty="0" err="1" smtClean="0">
-                <a:hlinkClick r:id="rId4"/>
+                <a:hlinkClick r:id="rId3"/>
               </a:rPr>
               <a:t>qr</a:t>
             </a:r>
             <a:r>
               <a:rPr lang="en-US" sz="2400" dirty="0" smtClean="0">
-                <a:hlinkClick r:id="rId4"/>
+                <a:hlinkClick r:id="rId3"/>
               </a:rPr>
               <a:t>-code-how-its-different-from-</a:t>
             </a:r>
             <a:r>
               <a:rPr lang="en-US" sz="2400" dirty="0" err="1" smtClean="0">
-                <a:hlinkClick r:id="rId4"/>
+                <a:hlinkClick r:id="rId3"/>
               </a:rPr>
               <a:t>barcode.html</a:t>
             </a:r>
@@ -21541,7 +21563,7 @@
               <a:buChar char="➢"/>
             </a:pPr>
             <a:r>
-              <a:rPr lang="en-US" sz="2400">
+              <a:rPr lang="en-US" sz="2400" dirty="0">
                 <a:latin typeface="Times New Roman"/>
                 <a:ea typeface="Times New Roman"/>
                 <a:cs typeface="Times New Roman"/>
@@ -21572,13 +21594,22 @@
               <a:buChar char="➢"/>
             </a:pPr>
             <a:r>
-              <a:rPr lang="en-US" sz="2400">
+              <a:rPr lang="en-US" sz="2400" dirty="0">
                 <a:latin typeface="Times New Roman"/>
                 <a:ea typeface="Times New Roman"/>
                 <a:cs typeface="Times New Roman"/>
                 <a:sym typeface="Times New Roman"/>
               </a:rPr>
               <a:t>Used to search books one by </a:t>
+            </a:r>
+            <a:r>
+              <a:rPr lang="en-US" sz="2400" dirty="0" smtClean="0">
+                <a:latin typeface="Times New Roman"/>
+                <a:ea typeface="Times New Roman"/>
+                <a:cs typeface="Times New Roman"/>
+                <a:sym typeface="Times New Roman"/>
+              </a:rPr>
+              <a:t>one</a:t>
             </a:r>
             <a:endParaRPr sz="2400">
               <a:latin typeface="Times New Roman"/>
@@ -21603,7 +21634,7 @@
               <a:buChar char="➢"/>
             </a:pPr>
             <a:r>
-              <a:rPr lang="en-US" sz="2400">
+              <a:rPr lang="en-US" sz="2400" dirty="0">
                 <a:latin typeface="Times New Roman"/>
                 <a:ea typeface="Times New Roman"/>
                 <a:cs typeface="Times New Roman"/>
@@ -21651,7 +21682,7 @@
               <a:buNone/>
             </a:pPr>
             <a:r>
-              <a:rPr lang="en-US" sz="2400">
+              <a:rPr lang="en-US" sz="2400" dirty="0">
                 <a:solidFill>
                   <a:srgbClr val="FF9900"/>
                 </a:solidFill>
@@ -21688,7 +21719,7 @@
               <a:buChar char="➢"/>
             </a:pPr>
             <a:r>
-              <a:rPr lang="en-US" sz="2400">
+              <a:rPr lang="en-US" sz="2400" dirty="0">
                 <a:latin typeface="Times New Roman"/>
                 <a:ea typeface="Times New Roman"/>
                 <a:cs typeface="Times New Roman"/>
@@ -21719,7 +21750,7 @@
               <a:buChar char="➢"/>
             </a:pPr>
             <a:r>
-              <a:rPr lang="en-US" sz="2400">
+              <a:rPr lang="en-US" sz="2400" dirty="0">
                 <a:latin typeface="Times New Roman"/>
                 <a:ea typeface="Times New Roman"/>
                 <a:cs typeface="Times New Roman"/>
@@ -21750,7 +21781,7 @@
               <a:buChar char="➢"/>
             </a:pPr>
             <a:r>
-              <a:rPr lang="en-US" sz="2400">
+              <a:rPr lang="en-US" sz="2400" dirty="0">
                 <a:latin typeface="Times New Roman"/>
                 <a:ea typeface="Times New Roman"/>
                 <a:cs typeface="Times New Roman"/>
@@ -21781,7 +21812,7 @@
               <a:buChar char="➢"/>
             </a:pPr>
             <a:r>
-              <a:rPr lang="en-US" sz="2400">
+              <a:rPr lang="en-US" sz="2400" dirty="0">
                 <a:latin typeface="Times New Roman"/>
                 <a:ea typeface="Times New Roman"/>
                 <a:cs typeface="Times New Roman"/>
@@ -21824,7 +21855,7 @@
               <a:buNone/>
             </a:pPr>
             <a:r>
-              <a:rPr lang="en-US" sz="2400">
+              <a:rPr lang="en-US" sz="2400" dirty="0">
                 <a:latin typeface="Times New Roman"/>
                 <a:ea typeface="Times New Roman"/>
                 <a:cs typeface="Times New Roman"/>
@@ -23090,7 +23121,7 @@
         </p:nvGraphicFramePr>
         <p:xfrm>
           <a:off x="1083212" y="1997610"/>
-          <a:ext cx="6607126" cy="3516924"/>
+          <a:ext cx="6607126" cy="4103078"/>
         </p:xfrm>
         <a:graphic>
           <a:graphicData uri="http://schemas.openxmlformats.org/drawingml/2006/table">
@@ -23125,6 +23156,40 @@
                       <a:r>
                         <a:rPr lang="en-US" dirty="0" smtClean="0"/>
                         <a:t>Date</a:t>
+                      </a:r>
+                      <a:endParaRPr lang="en-US" dirty="0"/>
+                    </a:p>
+                  </a:txBody>
+                  <a:tcPr/>
+                </a:tc>
+              </a:tr>
+              <a:tr h="586154">
+                <a:tc>
+                  <a:txBody>
+                    <a:bodyPr/>
+                    <a:lstStyle/>
+                    <a:p>
+                      <a:r>
+                        <a:rPr lang="en-US" dirty="0" smtClean="0"/>
+                        <a:t>Requirements and </a:t>
+                      </a:r>
+                      <a:r>
+                        <a:rPr lang="en-US" dirty="0" err="1" smtClean="0"/>
+                        <a:t>Ananlysis</a:t>
+                      </a:r>
+                      <a:endParaRPr lang="en-US" dirty="0"/>
+                    </a:p>
+                  </a:txBody>
+                  <a:tcPr/>
+                </a:tc>
+                <a:tc>
+                  <a:txBody>
+                    <a:bodyPr/>
+                    <a:lstStyle/>
+                    <a:p>
+                      <a:r>
+                        <a:rPr lang="en-US" smtClean="0"/>
+                        <a:t>07-01-2020</a:t>
                       </a:r>
                       <a:endParaRPr lang="en-US" dirty="0"/>
                     </a:p>
@@ -23225,7 +23290,7 @@
                     <a:lstStyle/>
                     <a:p>
                       <a:r>
-                        <a:rPr lang="en-US" smtClean="0"/>
+                        <a:rPr lang="en-US" dirty="0" smtClean="0"/>
                         <a:t>05-03-2020</a:t>
                       </a:r>
                       <a:endParaRPr lang="en-US" dirty="0"/>

</xml_diff>